<commit_message>
Pointing out Message Source
</commit_message>
<xml_diff>
--- a/Documentation/EnirKesto flow ppt.pptx
+++ b/Documentation/EnirKesto flow ppt.pptx
@@ -3682,12 +3682,20 @@
           <a:p>
             <a:pPr algn="ctr"/>
             <a:r>
-              <a:rPr lang="nb-NO" sz="1400" dirty="0">
+              <a:rPr lang="nb-NO" sz="1400" dirty="0" smtClean="0">
                 <a:solidFill>
                   <a:schemeClr val="tx2"/>
                 </a:solidFill>
               </a:rPr>
-              <a:t>POP3 Messages</a:t>
+              <a:t>Message Source </a:t>
+            </a:r>
+            <a:r>
+              <a:rPr lang="nb-NO" sz="1000" dirty="0" smtClean="0">
+                <a:solidFill>
+                  <a:schemeClr val="tx2"/>
+                </a:solidFill>
+              </a:rPr>
+              <a:t>(e.g. POP3, Manual)</a:t>
             </a:r>
             <a:endParaRPr lang="en-US" sz="1400" dirty="0">
               <a:solidFill>

</xml_diff>